<commit_message>
lecture 04 was conducted
</commit_message>
<xml_diff>
--- a/MSBI.Lecture.04/MSBI.Dev.S19E04.pptx
+++ b/MSBI.Lecture.04/MSBI.Dev.S19E04.pptx
@@ -1233,7 +1233,7 @@
           <a:p>
             <a:fld id="{7F5E9BF7-95E4-A242-BA1D-05FDCF603BE6}" type="datetime1">
               <a:rPr lang="en-US" smtClean="0"/>
-              <a:t>2/10/2019</a:t>
+              <a:t>2/11/2019</a:t>
             </a:fld>
             <a:endParaRPr lang="en-US"/>
           </a:p>
@@ -1399,7 +1399,7 @@
           <a:p>
             <a:fld id="{165DBCB1-0306-AD41-9452-11E7C08D5C04}" type="datetime1">
               <a:rPr lang="en-US" smtClean="0"/>
-              <a:t>2/10/2019</a:t>
+              <a:t>2/11/2019</a:t>
             </a:fld>
             <a:endParaRPr lang="en-US"/>
           </a:p>
@@ -1694,12 +1694,7 @@
             <p:ph type="sldImg"/>
           </p:nvPr>
         </p:nvSpPr>
-        <p:spPr>
-          <a:xfrm>
-            <a:off x="381000" y="685800"/>
-            <a:ext cx="6096000" cy="3429000"/>
-          </a:xfrm>
-        </p:spPr>
+        <p:spPr/>
       </p:sp>
       <p:sp>
         <p:nvSpPr>
@@ -1716,23 +1711,6 @@
           <a:bodyPr/>
           <a:lstStyle/>
           <a:p>
-            <a:pPr marL="0" marR="0" indent="0" algn="l" defTabSz="914400" rtl="0" eaLnBrk="1" fontAlgn="auto" latinLnBrk="0" hangingPunct="1">
-              <a:lnSpc>
-                <a:spcPct val="100000"/>
-              </a:lnSpc>
-              <a:spcBef>
-                <a:spcPts val="0"/>
-              </a:spcBef>
-              <a:spcAft>
-                <a:spcPts val="0"/>
-              </a:spcAft>
-              <a:buClrTx/>
-              <a:buSzTx/>
-              <a:buFontTx/>
-              <a:buNone/>
-              <a:tabLst/>
-              <a:defRPr/>
-            </a:pPr>
             <a:endParaRPr lang="en-US" dirty="0"/>
           </a:p>
         </p:txBody>
@@ -1744,7 +1722,7 @@
             <a:spLocks noGrp="1"/>
           </p:cNvSpPr>
           <p:nvPr>
-            <p:ph type="sldNum" sz="quarter" idx="10"/>
+            <p:ph type="sldNum" sz="quarter" idx="5"/>
           </p:nvPr>
         </p:nvSpPr>
         <p:spPr/>
@@ -1754,7 +1732,7 @@
           <a:p>
             <a:fld id="{7AE90029-A909-AD4E-9775-A0D64990AD22}" type="slidenum">
               <a:rPr lang="en-US" smtClean="0"/>
-              <a:t>2</a:t>
+              <a:t>1</a:t>
             </a:fld>
             <a:endParaRPr lang="en-US"/>
           </a:p>
@@ -1763,7 +1741,7 @@
     </p:spTree>
     <p:extLst>
       <p:ext uri="{BB962C8B-B14F-4D97-AF65-F5344CB8AC3E}">
-        <p14:creationId xmlns:p14="http://schemas.microsoft.com/office/powerpoint/2010/main" val="1082247773"/>
+        <p14:creationId xmlns:p14="http://schemas.microsoft.com/office/powerpoint/2010/main" val="1811522443"/>
       </p:ext>
     </p:extLst>
   </p:cSld>
@@ -1860,7 +1838,7 @@
           <a:p>
             <a:fld id="{7AE90029-A909-AD4E-9775-A0D64990AD22}" type="slidenum">
               <a:rPr lang="en-US" smtClean="0"/>
-              <a:t>11</a:t>
+              <a:t>10</a:t>
             </a:fld>
             <a:endParaRPr lang="en-US"/>
           </a:p>
@@ -1869,7 +1847,7 @@
     </p:spTree>
     <p:extLst>
       <p:ext uri="{BB962C8B-B14F-4D97-AF65-F5344CB8AC3E}">
-        <p14:creationId xmlns:p14="http://schemas.microsoft.com/office/powerpoint/2010/main" val="2250176533"/>
+        <p14:creationId xmlns:p14="http://schemas.microsoft.com/office/powerpoint/2010/main" val="3395408323"/>
       </p:ext>
     </p:extLst>
   </p:cSld>
@@ -1966,7 +1944,7 @@
           <a:p>
             <a:fld id="{7AE90029-A909-AD4E-9775-A0D64990AD22}" type="slidenum">
               <a:rPr lang="en-US" smtClean="0"/>
-              <a:t>12</a:t>
+              <a:t>11</a:t>
             </a:fld>
             <a:endParaRPr lang="en-US"/>
           </a:p>
@@ -1975,7 +1953,7 @@
     </p:spTree>
     <p:extLst>
       <p:ext uri="{BB962C8B-B14F-4D97-AF65-F5344CB8AC3E}">
-        <p14:creationId xmlns:p14="http://schemas.microsoft.com/office/powerpoint/2010/main" val="349202656"/>
+        <p14:creationId xmlns:p14="http://schemas.microsoft.com/office/powerpoint/2010/main" val="2250176533"/>
       </p:ext>
     </p:extLst>
   </p:cSld>
@@ -2072,7 +2050,7 @@
           <a:p>
             <a:fld id="{7AE90029-A909-AD4E-9775-A0D64990AD22}" type="slidenum">
               <a:rPr lang="en-US" smtClean="0"/>
-              <a:t>13</a:t>
+              <a:t>12</a:t>
             </a:fld>
             <a:endParaRPr lang="en-US"/>
           </a:p>
@@ -2081,7 +2059,7 @@
     </p:spTree>
     <p:extLst>
       <p:ext uri="{BB962C8B-B14F-4D97-AF65-F5344CB8AC3E}">
-        <p14:creationId xmlns:p14="http://schemas.microsoft.com/office/powerpoint/2010/main" val="2414064186"/>
+        <p14:creationId xmlns:p14="http://schemas.microsoft.com/office/powerpoint/2010/main" val="349202656"/>
       </p:ext>
     </p:extLst>
   </p:cSld>
@@ -2157,7 +2135,7 @@
               <a:tabLst/>
               <a:defRPr/>
             </a:pPr>
-            <a:endParaRPr lang="en-US" dirty="0"/>
+            <a:endParaRPr lang="en-US"/>
           </a:p>
         </p:txBody>
       </p:sp>
@@ -2178,7 +2156,7 @@
           <a:p>
             <a:fld id="{7AE90029-A909-AD4E-9775-A0D64990AD22}" type="slidenum">
               <a:rPr lang="en-US" smtClean="0"/>
-              <a:t>14</a:t>
+              <a:t>13</a:t>
             </a:fld>
             <a:endParaRPr lang="en-US"/>
           </a:p>
@@ -2187,7 +2165,7 @@
     </p:spTree>
     <p:extLst>
       <p:ext uri="{BB962C8B-B14F-4D97-AF65-F5344CB8AC3E}">
-        <p14:creationId xmlns:p14="http://schemas.microsoft.com/office/powerpoint/2010/main" val="481582014"/>
+        <p14:creationId xmlns:p14="http://schemas.microsoft.com/office/powerpoint/2010/main" val="2414064186"/>
       </p:ext>
     </p:extLst>
   </p:cSld>
@@ -2263,7 +2241,7 @@
               <a:tabLst/>
               <a:defRPr/>
             </a:pPr>
-            <a:endParaRPr lang="en-US"/>
+            <a:endParaRPr lang="en-US" dirty="0"/>
           </a:p>
         </p:txBody>
       </p:sp>
@@ -2284,7 +2262,7 @@
           <a:p>
             <a:fld id="{7AE90029-A909-AD4E-9775-A0D64990AD22}" type="slidenum">
               <a:rPr lang="en-US" smtClean="0"/>
-              <a:t>15</a:t>
+              <a:t>14</a:t>
             </a:fld>
             <a:endParaRPr lang="en-US"/>
           </a:p>
@@ -2293,7 +2271,7 @@
     </p:spTree>
     <p:extLst>
       <p:ext uri="{BB962C8B-B14F-4D97-AF65-F5344CB8AC3E}">
-        <p14:creationId xmlns:p14="http://schemas.microsoft.com/office/powerpoint/2010/main" val="67177876"/>
+        <p14:creationId xmlns:p14="http://schemas.microsoft.com/office/powerpoint/2010/main" val="481582014"/>
       </p:ext>
     </p:extLst>
   </p:cSld>
@@ -2369,7 +2347,7 @@
               <a:tabLst/>
               <a:defRPr/>
             </a:pPr>
-            <a:endParaRPr lang="en-US" dirty="0"/>
+            <a:endParaRPr lang="en-US"/>
           </a:p>
         </p:txBody>
       </p:sp>
@@ -2390,7 +2368,7 @@
           <a:p>
             <a:fld id="{7AE90029-A909-AD4E-9775-A0D64990AD22}" type="slidenum">
               <a:rPr lang="en-US" smtClean="0"/>
-              <a:t>16</a:t>
+              <a:t>15</a:t>
             </a:fld>
             <a:endParaRPr lang="en-US"/>
           </a:p>
@@ -2399,7 +2377,7 @@
     </p:spTree>
     <p:extLst>
       <p:ext uri="{BB962C8B-B14F-4D97-AF65-F5344CB8AC3E}">
-        <p14:creationId xmlns:p14="http://schemas.microsoft.com/office/powerpoint/2010/main" val="1947853649"/>
+        <p14:creationId xmlns:p14="http://schemas.microsoft.com/office/powerpoint/2010/main" val="67177876"/>
       </p:ext>
     </p:extLst>
   </p:cSld>
@@ -2496,7 +2474,7 @@
           <a:p>
             <a:fld id="{7AE90029-A909-AD4E-9775-A0D64990AD22}" type="slidenum">
               <a:rPr lang="en-US" smtClean="0"/>
-              <a:t>17</a:t>
+              <a:t>16</a:t>
             </a:fld>
             <a:endParaRPr lang="en-US"/>
           </a:p>
@@ -2505,7 +2483,7 @@
     </p:spTree>
     <p:extLst>
       <p:ext uri="{BB962C8B-B14F-4D97-AF65-F5344CB8AC3E}">
-        <p14:creationId xmlns:p14="http://schemas.microsoft.com/office/powerpoint/2010/main" val="3780097163"/>
+        <p14:creationId xmlns:p14="http://schemas.microsoft.com/office/powerpoint/2010/main" val="1947853649"/>
       </p:ext>
     </p:extLst>
   </p:cSld>
@@ -2581,7 +2559,7 @@
               <a:tabLst/>
               <a:defRPr/>
             </a:pPr>
-            <a:endParaRPr lang="en-US"/>
+            <a:endParaRPr lang="en-US" dirty="0"/>
           </a:p>
         </p:txBody>
       </p:sp>
@@ -2602,7 +2580,7 @@
           <a:p>
             <a:fld id="{7AE90029-A909-AD4E-9775-A0D64990AD22}" type="slidenum">
               <a:rPr lang="en-US" smtClean="0"/>
-              <a:t>18</a:t>
+              <a:t>17</a:t>
             </a:fld>
             <a:endParaRPr lang="en-US"/>
           </a:p>
@@ -2611,7 +2589,7 @@
     </p:spTree>
     <p:extLst>
       <p:ext uri="{BB962C8B-B14F-4D97-AF65-F5344CB8AC3E}">
-        <p14:creationId xmlns:p14="http://schemas.microsoft.com/office/powerpoint/2010/main" val="2747750476"/>
+        <p14:creationId xmlns:p14="http://schemas.microsoft.com/office/powerpoint/2010/main" val="3780097163"/>
       </p:ext>
     </p:extLst>
   </p:cSld>
@@ -2687,7 +2665,7 @@
               <a:tabLst/>
               <a:defRPr/>
             </a:pPr>
-            <a:endParaRPr lang="en-US" dirty="0"/>
+            <a:endParaRPr lang="en-US"/>
           </a:p>
         </p:txBody>
       </p:sp>
@@ -2708,7 +2686,7 @@
           <a:p>
             <a:fld id="{7AE90029-A909-AD4E-9775-A0D64990AD22}" type="slidenum">
               <a:rPr lang="en-US" smtClean="0"/>
-              <a:t>19</a:t>
+              <a:t>18</a:t>
             </a:fld>
             <a:endParaRPr lang="en-US"/>
           </a:p>
@@ -2717,7 +2695,7 @@
     </p:spTree>
     <p:extLst>
       <p:ext uri="{BB962C8B-B14F-4D97-AF65-F5344CB8AC3E}">
-        <p14:creationId xmlns:p14="http://schemas.microsoft.com/office/powerpoint/2010/main" val="1196918068"/>
+        <p14:creationId xmlns:p14="http://schemas.microsoft.com/office/powerpoint/2010/main" val="2747750476"/>
       </p:ext>
     </p:extLst>
   </p:cSld>
@@ -2814,7 +2792,7 @@
           <a:p>
             <a:fld id="{7AE90029-A909-AD4E-9775-A0D64990AD22}" type="slidenum">
               <a:rPr lang="en-US" smtClean="0"/>
-              <a:t>20</a:t>
+              <a:t>19</a:t>
             </a:fld>
             <a:endParaRPr lang="en-US"/>
           </a:p>
@@ -2823,7 +2801,7 @@
     </p:spTree>
     <p:extLst>
       <p:ext uri="{BB962C8B-B14F-4D97-AF65-F5344CB8AC3E}">
-        <p14:creationId xmlns:p14="http://schemas.microsoft.com/office/powerpoint/2010/main" val="3250410801"/>
+        <p14:creationId xmlns:p14="http://schemas.microsoft.com/office/powerpoint/2010/main" val="1196918068"/>
       </p:ext>
     </p:extLst>
   </p:cSld>
@@ -2920,7 +2898,7 @@
           <a:p>
             <a:fld id="{7AE90029-A909-AD4E-9775-A0D64990AD22}" type="slidenum">
               <a:rPr lang="en-US" smtClean="0"/>
-              <a:t>3</a:t>
+              <a:t>2</a:t>
             </a:fld>
             <a:endParaRPr lang="en-US"/>
           </a:p>
@@ -2929,7 +2907,7 @@
     </p:spTree>
     <p:extLst>
       <p:ext uri="{BB962C8B-B14F-4D97-AF65-F5344CB8AC3E}">
-        <p14:creationId xmlns:p14="http://schemas.microsoft.com/office/powerpoint/2010/main" val="3019862815"/>
+        <p14:creationId xmlns:p14="http://schemas.microsoft.com/office/powerpoint/2010/main" val="1082247773"/>
       </p:ext>
     </p:extLst>
   </p:cSld>
@@ -3026,7 +3004,7 @@
           <a:p>
             <a:fld id="{7AE90029-A909-AD4E-9775-A0D64990AD22}" type="slidenum">
               <a:rPr lang="en-US" smtClean="0"/>
-              <a:t>21</a:t>
+              <a:t>20</a:t>
             </a:fld>
             <a:endParaRPr lang="en-US"/>
           </a:p>
@@ -3035,7 +3013,7 @@
     </p:spTree>
     <p:extLst>
       <p:ext uri="{BB962C8B-B14F-4D97-AF65-F5344CB8AC3E}">
-        <p14:creationId xmlns:p14="http://schemas.microsoft.com/office/powerpoint/2010/main" val="73167587"/>
+        <p14:creationId xmlns:p14="http://schemas.microsoft.com/office/powerpoint/2010/main" val="3250410801"/>
       </p:ext>
     </p:extLst>
   </p:cSld>
@@ -3111,7 +3089,7 @@
               <a:tabLst/>
               <a:defRPr/>
             </a:pPr>
-            <a:endParaRPr lang="en-US"/>
+            <a:endParaRPr lang="en-US" dirty="0"/>
           </a:p>
         </p:txBody>
       </p:sp>
@@ -3132,7 +3110,7 @@
           <a:p>
             <a:fld id="{7AE90029-A909-AD4E-9775-A0D64990AD22}" type="slidenum">
               <a:rPr lang="en-US" smtClean="0"/>
-              <a:t>22</a:t>
+              <a:t>21</a:t>
             </a:fld>
             <a:endParaRPr lang="en-US"/>
           </a:p>
@@ -3141,7 +3119,7 @@
     </p:spTree>
     <p:extLst>
       <p:ext uri="{BB962C8B-B14F-4D97-AF65-F5344CB8AC3E}">
-        <p14:creationId xmlns:p14="http://schemas.microsoft.com/office/powerpoint/2010/main" val="172012463"/>
+        <p14:creationId xmlns:p14="http://schemas.microsoft.com/office/powerpoint/2010/main" val="73167587"/>
       </p:ext>
     </p:extLst>
   </p:cSld>
@@ -3217,7 +3195,7 @@
               <a:tabLst/>
               <a:defRPr/>
             </a:pPr>
-            <a:endParaRPr lang="en-US" dirty="0"/>
+            <a:endParaRPr lang="en-US"/>
           </a:p>
         </p:txBody>
       </p:sp>
@@ -3238,7 +3216,7 @@
           <a:p>
             <a:fld id="{7AE90029-A909-AD4E-9775-A0D64990AD22}" type="slidenum">
               <a:rPr lang="en-US" smtClean="0"/>
-              <a:t>23</a:t>
+              <a:t>22</a:t>
             </a:fld>
             <a:endParaRPr lang="en-US"/>
           </a:p>
@@ -3247,7 +3225,7 @@
     </p:spTree>
     <p:extLst>
       <p:ext uri="{BB962C8B-B14F-4D97-AF65-F5344CB8AC3E}">
-        <p14:creationId xmlns:p14="http://schemas.microsoft.com/office/powerpoint/2010/main" val="2235613283"/>
+        <p14:creationId xmlns:p14="http://schemas.microsoft.com/office/powerpoint/2010/main" val="172012463"/>
       </p:ext>
     </p:extLst>
   </p:cSld>
@@ -3344,7 +3322,7 @@
           <a:p>
             <a:fld id="{7AE90029-A909-AD4E-9775-A0D64990AD22}" type="slidenum">
               <a:rPr lang="en-US" smtClean="0"/>
-              <a:t>24</a:t>
+              <a:t>23</a:t>
             </a:fld>
             <a:endParaRPr lang="en-US"/>
           </a:p>
@@ -3353,7 +3331,7 @@
     </p:spTree>
     <p:extLst>
       <p:ext uri="{BB962C8B-B14F-4D97-AF65-F5344CB8AC3E}">
-        <p14:creationId xmlns:p14="http://schemas.microsoft.com/office/powerpoint/2010/main" val="1491311146"/>
+        <p14:creationId xmlns:p14="http://schemas.microsoft.com/office/powerpoint/2010/main" val="2235613283"/>
       </p:ext>
     </p:extLst>
   </p:cSld>
@@ -3429,7 +3407,7 @@
               <a:tabLst/>
               <a:defRPr/>
             </a:pPr>
-            <a:endParaRPr lang="en-US"/>
+            <a:endParaRPr lang="en-US" dirty="0"/>
           </a:p>
         </p:txBody>
       </p:sp>
@@ -3450,7 +3428,7 @@
           <a:p>
             <a:fld id="{7AE90029-A909-AD4E-9775-A0D64990AD22}" type="slidenum">
               <a:rPr lang="en-US" smtClean="0"/>
-              <a:t>25</a:t>
+              <a:t>24</a:t>
             </a:fld>
             <a:endParaRPr lang="en-US"/>
           </a:p>
@@ -3459,7 +3437,7 @@
     </p:spTree>
     <p:extLst>
       <p:ext uri="{BB962C8B-B14F-4D97-AF65-F5344CB8AC3E}">
-        <p14:creationId xmlns:p14="http://schemas.microsoft.com/office/powerpoint/2010/main" val="1598149465"/>
+        <p14:creationId xmlns:p14="http://schemas.microsoft.com/office/powerpoint/2010/main" val="1491311146"/>
       </p:ext>
     </p:extLst>
   </p:cSld>
@@ -3556,7 +3534,7 @@
           <a:p>
             <a:fld id="{7AE90029-A909-AD4E-9775-A0D64990AD22}" type="slidenum">
               <a:rPr lang="en-US" smtClean="0"/>
-              <a:t>26</a:t>
+              <a:t>25</a:t>
             </a:fld>
             <a:endParaRPr lang="en-US"/>
           </a:p>
@@ -3565,7 +3543,7 @@
     </p:spTree>
     <p:extLst>
       <p:ext uri="{BB962C8B-B14F-4D97-AF65-F5344CB8AC3E}">
-        <p14:creationId xmlns:p14="http://schemas.microsoft.com/office/powerpoint/2010/main" val="3355663554"/>
+        <p14:creationId xmlns:p14="http://schemas.microsoft.com/office/powerpoint/2010/main" val="1598149465"/>
       </p:ext>
     </p:extLst>
   </p:cSld>
@@ -3662,7 +3640,7 @@
           <a:p>
             <a:fld id="{7AE90029-A909-AD4E-9775-A0D64990AD22}" type="slidenum">
               <a:rPr lang="en-US" smtClean="0"/>
-              <a:t>27</a:t>
+              <a:t>26</a:t>
             </a:fld>
             <a:endParaRPr lang="en-US"/>
           </a:p>
@@ -3671,7 +3649,7 @@
     </p:spTree>
     <p:extLst>
       <p:ext uri="{BB962C8B-B14F-4D97-AF65-F5344CB8AC3E}">
-        <p14:creationId xmlns:p14="http://schemas.microsoft.com/office/powerpoint/2010/main" val="2858077827"/>
+        <p14:creationId xmlns:p14="http://schemas.microsoft.com/office/powerpoint/2010/main" val="3355663554"/>
       </p:ext>
     </p:extLst>
   </p:cSld>
@@ -3747,7 +3725,7 @@
               <a:tabLst/>
               <a:defRPr/>
             </a:pPr>
-            <a:endParaRPr lang="en-US" dirty="0"/>
+            <a:endParaRPr lang="en-US"/>
           </a:p>
         </p:txBody>
       </p:sp>
@@ -3768,7 +3746,7 @@
           <a:p>
             <a:fld id="{7AE90029-A909-AD4E-9775-A0D64990AD22}" type="slidenum">
               <a:rPr lang="en-US" smtClean="0"/>
-              <a:t>28</a:t>
+              <a:t>27</a:t>
             </a:fld>
             <a:endParaRPr lang="en-US"/>
           </a:p>
@@ -3777,7 +3755,7 @@
     </p:spTree>
     <p:extLst>
       <p:ext uri="{BB962C8B-B14F-4D97-AF65-F5344CB8AC3E}">
-        <p14:creationId xmlns:p14="http://schemas.microsoft.com/office/powerpoint/2010/main" val="4282178610"/>
+        <p14:creationId xmlns:p14="http://schemas.microsoft.com/office/powerpoint/2010/main" val="2858077827"/>
       </p:ext>
     </p:extLst>
   </p:cSld>
@@ -3874,7 +3852,7 @@
           <a:p>
             <a:fld id="{7AE90029-A909-AD4E-9775-A0D64990AD22}" type="slidenum">
               <a:rPr lang="en-US" smtClean="0"/>
-              <a:t>29</a:t>
+              <a:t>28</a:t>
             </a:fld>
             <a:endParaRPr lang="en-US"/>
           </a:p>
@@ -3883,7 +3861,7 @@
     </p:spTree>
     <p:extLst>
       <p:ext uri="{BB962C8B-B14F-4D97-AF65-F5344CB8AC3E}">
-        <p14:creationId xmlns:p14="http://schemas.microsoft.com/office/powerpoint/2010/main" val="2688725118"/>
+        <p14:creationId xmlns:p14="http://schemas.microsoft.com/office/powerpoint/2010/main" val="4282178610"/>
       </p:ext>
     </p:extLst>
   </p:cSld>
@@ -3980,7 +3958,7 @@
           <a:p>
             <a:fld id="{7AE90029-A909-AD4E-9775-A0D64990AD22}" type="slidenum">
               <a:rPr lang="en-US" smtClean="0"/>
-              <a:t>30</a:t>
+              <a:t>29</a:t>
             </a:fld>
             <a:endParaRPr lang="en-US"/>
           </a:p>
@@ -3989,7 +3967,7 @@
     </p:spTree>
     <p:extLst>
       <p:ext uri="{BB962C8B-B14F-4D97-AF65-F5344CB8AC3E}">
-        <p14:creationId xmlns:p14="http://schemas.microsoft.com/office/powerpoint/2010/main" val="1553846106"/>
+        <p14:creationId xmlns:p14="http://schemas.microsoft.com/office/powerpoint/2010/main" val="2688725118"/>
       </p:ext>
     </p:extLst>
   </p:cSld>
@@ -4065,7 +4043,7 @@
               <a:tabLst/>
               <a:defRPr/>
             </a:pPr>
-            <a:endParaRPr lang="en-US"/>
+            <a:endParaRPr lang="en-US" dirty="0"/>
           </a:p>
         </p:txBody>
       </p:sp>
@@ -4086,7 +4064,7 @@
           <a:p>
             <a:fld id="{7AE90029-A909-AD4E-9775-A0D64990AD22}" type="slidenum">
               <a:rPr lang="en-US" smtClean="0"/>
-              <a:t>4</a:t>
+              <a:t>3</a:t>
             </a:fld>
             <a:endParaRPr lang="en-US"/>
           </a:p>
@@ -4095,7 +4073,7 @@
     </p:spTree>
     <p:extLst>
       <p:ext uri="{BB962C8B-B14F-4D97-AF65-F5344CB8AC3E}">
-        <p14:creationId xmlns:p14="http://schemas.microsoft.com/office/powerpoint/2010/main" val="1567813526"/>
+        <p14:creationId xmlns:p14="http://schemas.microsoft.com/office/powerpoint/2010/main" val="3019862815"/>
       </p:ext>
     </p:extLst>
   </p:cSld>
@@ -4192,7 +4170,7 @@
           <a:p>
             <a:fld id="{7AE90029-A909-AD4E-9775-A0D64990AD22}" type="slidenum">
               <a:rPr lang="en-US" smtClean="0"/>
-              <a:t>31</a:t>
+              <a:t>30</a:t>
             </a:fld>
             <a:endParaRPr lang="en-US"/>
           </a:p>
@@ -4201,7 +4179,7 @@
     </p:spTree>
     <p:extLst>
       <p:ext uri="{BB962C8B-B14F-4D97-AF65-F5344CB8AC3E}">
-        <p14:creationId xmlns:p14="http://schemas.microsoft.com/office/powerpoint/2010/main" val="353487067"/>
+        <p14:creationId xmlns:p14="http://schemas.microsoft.com/office/powerpoint/2010/main" val="1553846106"/>
       </p:ext>
     </p:extLst>
   </p:cSld>
@@ -4298,6 +4276,112 @@
           <a:p>
             <a:fld id="{7AE90029-A909-AD4E-9775-A0D64990AD22}" type="slidenum">
               <a:rPr lang="en-US" smtClean="0"/>
+              <a:t>31</a:t>
+            </a:fld>
+            <a:endParaRPr lang="en-US"/>
+          </a:p>
+        </p:txBody>
+      </p:sp>
+    </p:spTree>
+    <p:extLst>
+      <p:ext uri="{BB962C8B-B14F-4D97-AF65-F5344CB8AC3E}">
+        <p14:creationId xmlns:p14="http://schemas.microsoft.com/office/powerpoint/2010/main" val="353487067"/>
+      </p:ext>
+    </p:extLst>
+  </p:cSld>
+  <p:clrMapOvr>
+    <a:masterClrMapping/>
+  </p:clrMapOvr>
+</p:notes>
+</file>
+
+<file path=ppt/notesSlides/notesSlide32.xml><?xml version="1.0" encoding="utf-8"?>
+<p:notes xmlns:a="http://schemas.openxmlformats.org/drawingml/2006/main" xmlns:r="http://schemas.openxmlformats.org/officeDocument/2006/relationships" xmlns:p="http://schemas.openxmlformats.org/presentationml/2006/main">
+  <p:cSld>
+    <p:spTree>
+      <p:nvGrpSpPr>
+        <p:cNvPr id="1" name=""/>
+        <p:cNvGrpSpPr/>
+        <p:nvPr/>
+      </p:nvGrpSpPr>
+      <p:grpSpPr>
+        <a:xfrm>
+          <a:off x="0" y="0"/>
+          <a:ext cx="0" cy="0"/>
+          <a:chOff x="0" y="0"/>
+          <a:chExt cx="0" cy="0"/>
+        </a:xfrm>
+      </p:grpSpPr>
+      <p:sp>
+        <p:nvSpPr>
+          <p:cNvPr id="2" name="Slide Image Placeholder 1"/>
+          <p:cNvSpPr>
+            <a:spLocks noGrp="1" noRot="1" noChangeAspect="1"/>
+          </p:cNvSpPr>
+          <p:nvPr>
+            <p:ph type="sldImg"/>
+          </p:nvPr>
+        </p:nvSpPr>
+        <p:spPr>
+          <a:xfrm>
+            <a:off x="381000" y="685800"/>
+            <a:ext cx="6096000" cy="3429000"/>
+          </a:xfrm>
+        </p:spPr>
+      </p:sp>
+      <p:sp>
+        <p:nvSpPr>
+          <p:cNvPr id="3" name="Notes Placeholder 2"/>
+          <p:cNvSpPr>
+            <a:spLocks noGrp="1"/>
+          </p:cNvSpPr>
+          <p:nvPr>
+            <p:ph type="body" idx="1"/>
+          </p:nvPr>
+        </p:nvSpPr>
+        <p:spPr/>
+        <p:txBody>
+          <a:bodyPr/>
+          <a:lstStyle/>
+          <a:p>
+            <a:pPr marL="0" marR="0" indent="0" algn="l" defTabSz="914400" rtl="0" eaLnBrk="1" fontAlgn="auto" latinLnBrk="0" hangingPunct="1">
+              <a:lnSpc>
+                <a:spcPct val="100000"/>
+              </a:lnSpc>
+              <a:spcBef>
+                <a:spcPts val="0"/>
+              </a:spcBef>
+              <a:spcAft>
+                <a:spcPts val="0"/>
+              </a:spcAft>
+              <a:buClrTx/>
+              <a:buSzTx/>
+              <a:buFontTx/>
+              <a:buNone/>
+              <a:tabLst/>
+              <a:defRPr/>
+            </a:pPr>
+            <a:endParaRPr lang="en-US" dirty="0"/>
+          </a:p>
+        </p:txBody>
+      </p:sp>
+      <p:sp>
+        <p:nvSpPr>
+          <p:cNvPr id="4" name="Slide Number Placeholder 3"/>
+          <p:cNvSpPr>
+            <a:spLocks noGrp="1"/>
+          </p:cNvSpPr>
+          <p:nvPr>
+            <p:ph type="sldNum" sz="quarter" idx="10"/>
+          </p:nvPr>
+        </p:nvSpPr>
+        <p:spPr/>
+        <p:txBody>
+          <a:bodyPr/>
+          <a:lstStyle/>
+          <a:p>
+            <a:fld id="{7AE90029-A909-AD4E-9775-A0D64990AD22}" type="slidenum">
+              <a:rPr lang="en-US" smtClean="0"/>
               <a:t>32</a:t>
             </a:fld>
             <a:endParaRPr lang="en-US"/>
@@ -4317,7 +4401,7 @@
 </p:notes>
 </file>
 
-<file path=ppt/notesSlides/notesSlide32.xml><?xml version="1.0" encoding="utf-8"?>
+<file path=ppt/notesSlides/notesSlide33.xml><?xml version="1.0" encoding="utf-8"?>
 <p:notes xmlns:a="http://schemas.openxmlformats.org/drawingml/2006/main" xmlns:r="http://schemas.openxmlformats.org/officeDocument/2006/relationships" xmlns:p="http://schemas.openxmlformats.org/presentationml/2006/main">
   <p:cSld>
     <p:spTree>
@@ -4472,43 +4556,23 @@
           <a:bodyPr/>
           <a:lstStyle/>
           <a:p>
-            <a:r>
-              <a:rPr lang="en-US" sz="900" b="0" i="0" u="none" strike="noStrike" kern="1200" baseline="0">
-                <a:solidFill>
-                  <a:schemeClr val="tx1"/>
-                </a:solidFill>
-                <a:latin typeface="+mn-lt"/>
-                <a:ea typeface="+mn-ea"/>
-                <a:cs typeface="+mn-cs"/>
-              </a:rPr>
-              <a:t>Note that if what’s supposed to be a scalar subquery returns in practice more than one</a:t>
-            </a:r>
-          </a:p>
-          <a:p>
-            <a:r>
-              <a:rPr lang="en-US" sz="900" b="0" i="0" u="none" strike="noStrike" kern="1200" baseline="0">
-                <a:solidFill>
-                  <a:schemeClr val="tx1"/>
-                </a:solidFill>
-                <a:latin typeface="+mn-lt"/>
-                <a:ea typeface="+mn-ea"/>
-                <a:cs typeface="+mn-cs"/>
-              </a:rPr>
-              <a:t>value, the code fails at run time. If the scalar subquery returns an empty set, it is converted to</a:t>
-            </a:r>
-          </a:p>
-          <a:p>
-            <a:r>
-              <a:rPr lang="en-US" sz="900" b="0" i="0" u="none" strike="noStrike" kern="1200" baseline="0">
-                <a:solidFill>
-                  <a:schemeClr val="tx1"/>
-                </a:solidFill>
-                <a:latin typeface="+mn-lt"/>
-                <a:ea typeface="+mn-ea"/>
-                <a:cs typeface="+mn-cs"/>
-              </a:rPr>
-              <a:t>a NULL.</a:t>
-            </a:r>
+            <a:pPr marL="0" marR="0" indent="0" algn="l" defTabSz="914400" rtl="0" eaLnBrk="1" fontAlgn="auto" latinLnBrk="0" hangingPunct="1">
+              <a:lnSpc>
+                <a:spcPct val="100000"/>
+              </a:lnSpc>
+              <a:spcBef>
+                <a:spcPts val="0"/>
+              </a:spcBef>
+              <a:spcAft>
+                <a:spcPts val="0"/>
+              </a:spcAft>
+              <a:buClrTx/>
+              <a:buSzTx/>
+              <a:buFontTx/>
+              <a:buNone/>
+              <a:tabLst/>
+              <a:defRPr/>
+            </a:pPr>
             <a:endParaRPr lang="en-US"/>
           </a:p>
         </p:txBody>
@@ -4530,7 +4594,7 @@
           <a:p>
             <a:fld id="{7AE90029-A909-AD4E-9775-A0D64990AD22}" type="slidenum">
               <a:rPr lang="en-US" smtClean="0"/>
-              <a:t>5</a:t>
+              <a:t>4</a:t>
             </a:fld>
             <a:endParaRPr lang="en-US"/>
           </a:p>
@@ -4539,7 +4603,7 @@
     </p:spTree>
     <p:extLst>
       <p:ext uri="{BB962C8B-B14F-4D97-AF65-F5344CB8AC3E}">
-        <p14:creationId xmlns:p14="http://schemas.microsoft.com/office/powerpoint/2010/main" val="2904338635"/>
+        <p14:creationId xmlns:p14="http://schemas.microsoft.com/office/powerpoint/2010/main" val="1567813526"/>
       </p:ext>
     </p:extLst>
   </p:cSld>
@@ -4598,23 +4662,43 @@
           <a:bodyPr/>
           <a:lstStyle/>
           <a:p>
-            <a:pPr marL="0" marR="0" indent="0" algn="l" defTabSz="914400" rtl="0" eaLnBrk="1" fontAlgn="auto" latinLnBrk="0" hangingPunct="1">
-              <a:lnSpc>
-                <a:spcPct val="100000"/>
-              </a:lnSpc>
-              <a:spcBef>
-                <a:spcPts val="0"/>
-              </a:spcBef>
-              <a:spcAft>
-                <a:spcPts val="0"/>
-              </a:spcAft>
-              <a:buClrTx/>
-              <a:buSzTx/>
-              <a:buFontTx/>
-              <a:buNone/>
-              <a:tabLst/>
-              <a:defRPr/>
-            </a:pPr>
+            <a:r>
+              <a:rPr lang="en-US" sz="900" b="0" i="0" u="none" strike="noStrike" kern="1200" baseline="0">
+                <a:solidFill>
+                  <a:schemeClr val="tx1"/>
+                </a:solidFill>
+                <a:latin typeface="+mn-lt"/>
+                <a:ea typeface="+mn-ea"/>
+                <a:cs typeface="+mn-cs"/>
+              </a:rPr>
+              <a:t>Note that if what’s supposed to be a scalar subquery returns in practice more than one</a:t>
+            </a:r>
+          </a:p>
+          <a:p>
+            <a:r>
+              <a:rPr lang="en-US" sz="900" b="0" i="0" u="none" strike="noStrike" kern="1200" baseline="0">
+                <a:solidFill>
+                  <a:schemeClr val="tx1"/>
+                </a:solidFill>
+                <a:latin typeface="+mn-lt"/>
+                <a:ea typeface="+mn-ea"/>
+                <a:cs typeface="+mn-cs"/>
+              </a:rPr>
+              <a:t>value, the code fails at run time. If the scalar subquery returns an empty set, it is converted to</a:t>
+            </a:r>
+          </a:p>
+          <a:p>
+            <a:r>
+              <a:rPr lang="en-US" sz="900" b="0" i="0" u="none" strike="noStrike" kern="1200" baseline="0">
+                <a:solidFill>
+                  <a:schemeClr val="tx1"/>
+                </a:solidFill>
+                <a:latin typeface="+mn-lt"/>
+                <a:ea typeface="+mn-ea"/>
+                <a:cs typeface="+mn-cs"/>
+              </a:rPr>
+              <a:t>a NULL.</a:t>
+            </a:r>
             <a:endParaRPr lang="en-US"/>
           </a:p>
         </p:txBody>
@@ -4636,7 +4720,7 @@
           <a:p>
             <a:fld id="{7AE90029-A909-AD4E-9775-A0D64990AD22}" type="slidenum">
               <a:rPr lang="en-US" smtClean="0"/>
-              <a:t>6</a:t>
+              <a:t>5</a:t>
             </a:fld>
             <a:endParaRPr lang="en-US"/>
           </a:p>
@@ -4645,7 +4729,7 @@
     </p:spTree>
     <p:extLst>
       <p:ext uri="{BB962C8B-B14F-4D97-AF65-F5344CB8AC3E}">
-        <p14:creationId xmlns:p14="http://schemas.microsoft.com/office/powerpoint/2010/main" val="4088057188"/>
+        <p14:creationId xmlns:p14="http://schemas.microsoft.com/office/powerpoint/2010/main" val="2904338635"/>
       </p:ext>
     </p:extLst>
   </p:cSld>
@@ -4742,7 +4826,7 @@
           <a:p>
             <a:fld id="{7AE90029-A909-AD4E-9775-A0D64990AD22}" type="slidenum">
               <a:rPr lang="en-US" smtClean="0"/>
-              <a:t>7</a:t>
+              <a:t>6</a:t>
             </a:fld>
             <a:endParaRPr lang="en-US"/>
           </a:p>
@@ -4751,7 +4835,7 @@
     </p:spTree>
     <p:extLst>
       <p:ext uri="{BB962C8B-B14F-4D97-AF65-F5344CB8AC3E}">
-        <p14:creationId xmlns:p14="http://schemas.microsoft.com/office/powerpoint/2010/main" val="464944882"/>
+        <p14:creationId xmlns:p14="http://schemas.microsoft.com/office/powerpoint/2010/main" val="4088057188"/>
       </p:ext>
     </p:extLst>
   </p:cSld>
@@ -4848,7 +4932,7 @@
           <a:p>
             <a:fld id="{7AE90029-A909-AD4E-9775-A0D64990AD22}" type="slidenum">
               <a:rPr lang="en-US" smtClean="0"/>
-              <a:t>8</a:t>
+              <a:t>7</a:t>
             </a:fld>
             <a:endParaRPr lang="en-US"/>
           </a:p>
@@ -4857,7 +4941,7 @@
     </p:spTree>
     <p:extLst>
       <p:ext uri="{BB962C8B-B14F-4D97-AF65-F5344CB8AC3E}">
-        <p14:creationId xmlns:p14="http://schemas.microsoft.com/office/powerpoint/2010/main" val="1018642374"/>
+        <p14:creationId xmlns:p14="http://schemas.microsoft.com/office/powerpoint/2010/main" val="464944882"/>
       </p:ext>
     </p:extLst>
   </p:cSld>
@@ -4954,7 +5038,7 @@
           <a:p>
             <a:fld id="{7AE90029-A909-AD4E-9775-A0D64990AD22}" type="slidenum">
               <a:rPr lang="en-US" smtClean="0"/>
-              <a:t>9</a:t>
+              <a:t>8</a:t>
             </a:fld>
             <a:endParaRPr lang="en-US"/>
           </a:p>
@@ -4963,7 +5047,7 @@
     </p:spTree>
     <p:extLst>
       <p:ext uri="{BB962C8B-B14F-4D97-AF65-F5344CB8AC3E}">
-        <p14:creationId xmlns:p14="http://schemas.microsoft.com/office/powerpoint/2010/main" val="1752352973"/>
+        <p14:creationId xmlns:p14="http://schemas.microsoft.com/office/powerpoint/2010/main" val="1018642374"/>
       </p:ext>
     </p:extLst>
   </p:cSld>
@@ -5060,7 +5144,7 @@
           <a:p>
             <a:fld id="{7AE90029-A909-AD4E-9775-A0D64990AD22}" type="slidenum">
               <a:rPr lang="en-US" smtClean="0"/>
-              <a:t>10</a:t>
+              <a:t>9</a:t>
             </a:fld>
             <a:endParaRPr lang="en-US"/>
           </a:p>
@@ -5069,7 +5153,7 @@
     </p:spTree>
     <p:extLst>
       <p:ext uri="{BB962C8B-B14F-4D97-AF65-F5344CB8AC3E}">
-        <p14:creationId xmlns:p14="http://schemas.microsoft.com/office/powerpoint/2010/main" val="3395408323"/>
+        <p14:creationId xmlns:p14="http://schemas.microsoft.com/office/powerpoint/2010/main" val="1752352973"/>
       </p:ext>
     </p:extLst>
   </p:cSld>
@@ -6585,7 +6669,7 @@
           </p:nvPr>
         </p:nvPicPr>
         <p:blipFill>
-          <a:blip r:embed="rId2" cstate="screen">
+          <a:blip r:embed="rId3" cstate="screen">
             <a:extLst>
               <a:ext uri="{28A0092B-C50C-407E-A947-70E740481C1C}">
                 <a14:useLocalDpi xmlns:a14="http://schemas.microsoft.com/office/drawing/2010/main"/>
@@ -6619,7 +6703,7 @@
           <p:nvPr/>
         </p:nvPicPr>
         <p:blipFill>
-          <a:blip r:embed="rId3"/>
+          <a:blip r:embed="rId4"/>
           <a:stretch>
             <a:fillRect/>
           </a:stretch>
@@ -8540,7 +8624,7 @@
         <p:spPr>
           <a:xfrm>
             <a:off x="491207" y="1761265"/>
-            <a:ext cx="1657804" cy="1920104"/>
+            <a:ext cx="1657804" cy="1658943"/>
           </a:xfrm>
           <a:prstGeom prst="ellipse">
             <a:avLst/>
@@ -8870,7 +8954,7 @@
         <p:spPr>
           <a:xfrm>
             <a:off x="522456" y="1746396"/>
-            <a:ext cx="1657804" cy="1920104"/>
+            <a:ext cx="1657804" cy="1656227"/>
           </a:xfrm>
           <a:prstGeom prst="ellipse">
             <a:avLst/>
@@ -10116,7 +10200,7 @@
         <p:spPr>
           <a:xfrm>
             <a:off x="522456" y="1746396"/>
-            <a:ext cx="1657804" cy="1920104"/>
+            <a:ext cx="1657804" cy="1629850"/>
           </a:xfrm>
           <a:prstGeom prst="ellipse">
             <a:avLst/>
@@ -10800,7 +10884,7 @@
         <p:spPr>
           <a:xfrm>
             <a:off x="522456" y="1746396"/>
-            <a:ext cx="1657804" cy="1920104"/>
+            <a:ext cx="1657804" cy="1682604"/>
           </a:xfrm>
           <a:prstGeom prst="ellipse">
             <a:avLst/>
@@ -10968,7 +11052,7 @@
         <p:spPr>
           <a:xfrm>
             <a:off x="522456" y="1746396"/>
-            <a:ext cx="1657804" cy="1920104"/>
+            <a:ext cx="1657804" cy="1568304"/>
           </a:xfrm>
           <a:prstGeom prst="ellipse">
             <a:avLst/>
@@ -13412,7 +13496,7 @@
         <p:spPr>
           <a:xfrm>
             <a:off x="454036" y="1611698"/>
-            <a:ext cx="1657804" cy="1920104"/>
+            <a:ext cx="1657804" cy="1667834"/>
           </a:xfrm>
           <a:prstGeom prst="ellipse">
             <a:avLst/>
@@ -16754,18 +16838,18 @@
 </file>
 
 <file path=customXml/item1.xml><?xml version="1.0" encoding="utf-8"?>
+<p:properties xmlns:p="http://schemas.microsoft.com/office/2006/metadata/properties" xmlns:xsi="http://www.w3.org/2001/XMLSchema-instance" xmlns:pc="http://schemas.microsoft.com/office/infopath/2007/PartnerControls">
+  <documentManagement/>
+</p:properties>
+</file>
+
+<file path=customXml/item2.xml><?xml version="1.0" encoding="utf-8"?>
 <?mso-contentType ?>
 <FormTemplates xmlns="http://schemas.microsoft.com/sharepoint/v3/contenttype/forms">
   <Display>DocumentLibraryForm</Display>
   <Edit>DocumentLibraryForm</Edit>
   <New>DocumentLibraryForm</New>
 </FormTemplates>
-</file>
-
-<file path=customXml/item2.xml><?xml version="1.0" encoding="utf-8"?>
-<p:properties xmlns:p="http://schemas.microsoft.com/office/2006/metadata/properties" xmlns:xsi="http://www.w3.org/2001/XMLSchema-instance" xmlns:pc="http://schemas.microsoft.com/office/infopath/2007/PartnerControls">
-  <documentManagement/>
-</p:properties>
 </file>
 
 <file path=customXml/item3.xml><?xml version="1.0" encoding="utf-8"?>
@@ -16934,14 +17018,6 @@
 </file>
 
 <file path=customXml/itemProps1.xml><?xml version="1.0" encoding="utf-8"?>
-<ds:datastoreItem xmlns:ds="http://schemas.openxmlformats.org/officeDocument/2006/customXml" ds:itemID="{14883F0F-DE57-4ECA-B9BB-F22E8C5B5D82}">
-  <ds:schemaRefs>
-    <ds:schemaRef ds:uri="http://schemas.microsoft.com/sharepoint/v3/contenttype/forms"/>
-  </ds:schemaRefs>
-</ds:datastoreItem>
-</file>
-
-<file path=customXml/itemProps2.xml><?xml version="1.0" encoding="utf-8"?>
 <ds:datastoreItem xmlns:ds="http://schemas.openxmlformats.org/officeDocument/2006/customXml" ds:itemID="{D5E3C081-4081-47AD-A9A6-9F18F525DA1D}">
   <ds:schemaRefs>
     <ds:schemaRef ds:uri="http://schemas.microsoft.com/office/2006/metadata/properties"/>
@@ -16954,6 +17030,14 @@
     <ds:schemaRef ds:uri="http://schemas.openxmlformats.org/package/2006/metadata/core-properties"/>
     <ds:schemaRef ds:uri="c8fb4810-c3cf-44db-bdf0-77d94482a97a"/>
     <ds:schemaRef ds:uri="http://purl.org/dc/terms/"/>
+  </ds:schemaRefs>
+</ds:datastoreItem>
+</file>
+
+<file path=customXml/itemProps2.xml><?xml version="1.0" encoding="utf-8"?>
+<ds:datastoreItem xmlns:ds="http://schemas.openxmlformats.org/officeDocument/2006/customXml" ds:itemID="{14883F0F-DE57-4ECA-B9BB-F22E8C5B5D82}">
+  <ds:schemaRefs>
+    <ds:schemaRef ds:uri="http://schemas.microsoft.com/sharepoint/v3/contenttype/forms"/>
   </ds:schemaRefs>
 </ds:datastoreItem>
 </file>

</xml_diff>